<commit_message>
final report after plagirism check
</commit_message>
<xml_diff>
--- a/Customer Churn Prediction in Telecom using Machine Learning.pptx
+++ b/Customer Churn Prediction in Telecom using Machine Learning.pptx
@@ -314,7 +314,7 @@
           <a:p>
             <a:fld id="{EBD7279A-E140-483C-96CB-95C0D4A7DA52}" type="datetimeFigureOut">
               <a:rPr lang="en-US" smtClean="0"/>
-              <a:t>8/8/2021</a:t>
+              <a:t>8/9/2021</a:t>
             </a:fld>
             <a:endParaRPr lang="en-US"/>
           </a:p>
@@ -512,7 +512,7 @@
           <a:p>
             <a:fld id="{EBD7279A-E140-483C-96CB-95C0D4A7DA52}" type="datetimeFigureOut">
               <a:rPr lang="en-US" smtClean="0"/>
-              <a:t>8/8/2021</a:t>
+              <a:t>8/9/2021</a:t>
             </a:fld>
             <a:endParaRPr lang="en-US"/>
           </a:p>
@@ -720,7 +720,7 @@
           <a:p>
             <a:fld id="{EBD7279A-E140-483C-96CB-95C0D4A7DA52}" type="datetimeFigureOut">
               <a:rPr lang="en-US" smtClean="0"/>
-              <a:t>8/8/2021</a:t>
+              <a:t>8/9/2021</a:t>
             </a:fld>
             <a:endParaRPr lang="en-US"/>
           </a:p>
@@ -918,7 +918,7 @@
           <a:p>
             <a:fld id="{EBD7279A-E140-483C-96CB-95C0D4A7DA52}" type="datetimeFigureOut">
               <a:rPr lang="en-US" smtClean="0"/>
-              <a:t>8/8/2021</a:t>
+              <a:t>8/9/2021</a:t>
             </a:fld>
             <a:endParaRPr lang="en-US"/>
           </a:p>
@@ -1193,7 +1193,7 @@
           <a:p>
             <a:fld id="{EBD7279A-E140-483C-96CB-95C0D4A7DA52}" type="datetimeFigureOut">
               <a:rPr lang="en-US" smtClean="0"/>
-              <a:t>8/8/2021</a:t>
+              <a:t>8/9/2021</a:t>
             </a:fld>
             <a:endParaRPr lang="en-US"/>
           </a:p>
@@ -1458,7 +1458,7 @@
           <a:p>
             <a:fld id="{EBD7279A-E140-483C-96CB-95C0D4A7DA52}" type="datetimeFigureOut">
               <a:rPr lang="en-US" smtClean="0"/>
-              <a:t>8/8/2021</a:t>
+              <a:t>8/9/2021</a:t>
             </a:fld>
             <a:endParaRPr lang="en-US"/>
           </a:p>
@@ -1870,7 +1870,7 @@
           <a:p>
             <a:fld id="{EBD7279A-E140-483C-96CB-95C0D4A7DA52}" type="datetimeFigureOut">
               <a:rPr lang="en-US" smtClean="0"/>
-              <a:t>8/8/2021</a:t>
+              <a:t>8/9/2021</a:t>
             </a:fld>
             <a:endParaRPr lang="en-US"/>
           </a:p>
@@ -2011,7 +2011,7 @@
           <a:p>
             <a:fld id="{EBD7279A-E140-483C-96CB-95C0D4A7DA52}" type="datetimeFigureOut">
               <a:rPr lang="en-US" smtClean="0"/>
-              <a:t>8/8/2021</a:t>
+              <a:t>8/9/2021</a:t>
             </a:fld>
             <a:endParaRPr lang="en-US"/>
           </a:p>
@@ -2124,7 +2124,7 @@
           <a:p>
             <a:fld id="{EBD7279A-E140-483C-96CB-95C0D4A7DA52}" type="datetimeFigureOut">
               <a:rPr lang="en-US" smtClean="0"/>
-              <a:t>8/8/2021</a:t>
+              <a:t>8/9/2021</a:t>
             </a:fld>
             <a:endParaRPr lang="en-US"/>
           </a:p>
@@ -2435,7 +2435,7 @@
           <a:p>
             <a:fld id="{EBD7279A-E140-483C-96CB-95C0D4A7DA52}" type="datetimeFigureOut">
               <a:rPr lang="en-US" smtClean="0"/>
-              <a:t>8/8/2021</a:t>
+              <a:t>8/9/2021</a:t>
             </a:fld>
             <a:endParaRPr lang="en-US"/>
           </a:p>
@@ -2723,7 +2723,7 @@
           <a:p>
             <a:fld id="{EBD7279A-E140-483C-96CB-95C0D4A7DA52}" type="datetimeFigureOut">
               <a:rPr lang="en-US" smtClean="0"/>
-              <a:t>8/8/2021</a:t>
+              <a:t>8/9/2021</a:t>
             </a:fld>
             <a:endParaRPr lang="en-US"/>
           </a:p>
@@ -2964,7 +2964,7 @@
           <a:p>
             <a:fld id="{EBD7279A-E140-483C-96CB-95C0D4A7DA52}" type="datetimeFigureOut">
               <a:rPr lang="en-US" smtClean="0"/>
-              <a:t>8/8/2021</a:t>
+              <a:t>8/9/2021</a:t>
             </a:fld>
             <a:endParaRPr lang="en-US"/>
           </a:p>
@@ -3444,9 +3444,10 @@
           <a:lstStyle/>
           <a:p>
             <a:r>
-              <a:rPr lang="en-US" dirty="0"/>
-              <a:t>DISSERTATION</a:t>
-            </a:r>
+              <a:rPr lang="en-US"/>
+              <a:t>Presentation</a:t>
+            </a:r>
+            <a:endParaRPr lang="en-US" dirty="0"/>
           </a:p>
         </p:txBody>
       </p:sp>

</xml_diff>